<commit_message>
Added slide on use of make
</commit_message>
<xml_diff>
--- a/CPlusPlus/03_essential_cpp_mod.pptx
+++ b/CPlusPlus/03_essential_cpp_mod.pptx
@@ -4481,7 +4481,43 @@
           <a:bodyPr/>
           <a:lstStyle/>
           <a:p>
-            <a:endParaRPr lang="en-US"/>
+            <a:r>
+              <a:rPr lang="en-US" dirty="0" smtClean="0"/>
+              <a:t>Build executable</a:t>
+            </a:r>
+          </a:p>
+          <a:p>
+            <a:endParaRPr lang="en-US" dirty="0"/>
+          </a:p>
+          <a:p>
+            <a:endParaRPr lang="en-US" dirty="0" smtClean="0"/>
+          </a:p>
+          <a:p>
+            <a:r>
+              <a:rPr lang="en-US" dirty="0" smtClean="0"/>
+              <a:t>Only execute targets with modified dependencies</a:t>
+            </a:r>
+          </a:p>
+          <a:p>
+            <a:pPr lvl="1"/>
+            <a:r>
+              <a:rPr lang="en-US" dirty="0" smtClean="0"/>
+              <a:t>dependency tracking</a:t>
+            </a:r>
+          </a:p>
+          <a:p>
+            <a:pPr lvl="1"/>
+            <a:r>
+              <a:rPr lang="en-US" dirty="0" smtClean="0"/>
+              <a:t>saves lots of time on large projects</a:t>
+            </a:r>
+          </a:p>
+          <a:p>
+            <a:r>
+              <a:rPr lang="en-US" dirty="0" smtClean="0"/>
+              <a:t>Clean all build artifacts</a:t>
+            </a:r>
+            <a:endParaRPr lang="en-US" dirty="0"/>
           </a:p>
         </p:txBody>
       </p:sp>
@@ -4508,6 +4544,94 @@
           </a:p>
         </p:txBody>
       </p:sp>
+      <p:sp>
+        <p:nvSpPr>
+          <p:cNvPr id="5" name="TextBox 4"/>
+          <p:cNvSpPr txBox="1"/>
+          <p:nvPr/>
+        </p:nvSpPr>
+        <p:spPr>
+          <a:xfrm>
+            <a:off x="1445341" y="2458063"/>
+            <a:ext cx="2114681" cy="369332"/>
+          </a:xfrm>
+          <a:prstGeom prst="rect">
+            <a:avLst/>
+          </a:prstGeom>
+          <a:solidFill>
+            <a:schemeClr val="tx1"/>
+          </a:solidFill>
+        </p:spPr>
+        <p:txBody>
+          <a:bodyPr wrap="square" rtlCol="0">
+            <a:spAutoFit/>
+          </a:bodyPr>
+          <a:lstStyle/>
+          <a:p>
+            <a:r>
+              <a:rPr lang="en-US" b="1" dirty="0" smtClean="0">
+                <a:solidFill>
+                  <a:schemeClr val="bg1"/>
+                </a:solidFill>
+                <a:latin typeface="Courier New" panose="02070309020205020404" pitchFamily="49" charset="0"/>
+                <a:cs typeface="Courier New" panose="02070309020205020404" pitchFamily="49" charset="0"/>
+              </a:rPr>
+              <a:t>$  make</a:t>
+            </a:r>
+            <a:endParaRPr lang="en-US" b="1" dirty="0">
+              <a:solidFill>
+                <a:schemeClr val="bg1"/>
+              </a:solidFill>
+              <a:latin typeface="Courier New" panose="02070309020205020404" pitchFamily="49" charset="0"/>
+              <a:cs typeface="Courier New" panose="02070309020205020404" pitchFamily="49" charset="0"/>
+            </a:endParaRPr>
+          </a:p>
+        </p:txBody>
+      </p:sp>
+      <p:sp>
+        <p:nvSpPr>
+          <p:cNvPr id="6" name="TextBox 5"/>
+          <p:cNvSpPr txBox="1"/>
+          <p:nvPr/>
+        </p:nvSpPr>
+        <p:spPr>
+          <a:xfrm>
+            <a:off x="1445342" y="5245506"/>
+            <a:ext cx="2114681" cy="369332"/>
+          </a:xfrm>
+          <a:prstGeom prst="rect">
+            <a:avLst/>
+          </a:prstGeom>
+          <a:solidFill>
+            <a:schemeClr val="tx1"/>
+          </a:solidFill>
+        </p:spPr>
+        <p:txBody>
+          <a:bodyPr wrap="none" rtlCol="0">
+            <a:spAutoFit/>
+          </a:bodyPr>
+          <a:lstStyle/>
+          <a:p>
+            <a:r>
+              <a:rPr lang="en-US" b="1" dirty="0" smtClean="0">
+                <a:solidFill>
+                  <a:schemeClr val="bg1"/>
+                </a:solidFill>
+                <a:latin typeface="Courier New" panose="02070309020205020404" pitchFamily="49" charset="0"/>
+                <a:cs typeface="Courier New" panose="02070309020205020404" pitchFamily="49" charset="0"/>
+              </a:rPr>
+              <a:t>$  make  clean</a:t>
+            </a:r>
+            <a:endParaRPr lang="en-US" b="1" dirty="0">
+              <a:solidFill>
+                <a:schemeClr val="bg1"/>
+              </a:solidFill>
+              <a:latin typeface="Courier New" panose="02070309020205020404" pitchFamily="49" charset="0"/>
+              <a:cs typeface="Courier New" panose="02070309020205020404" pitchFamily="49" charset="0"/>
+            </a:endParaRPr>
+          </a:p>
+        </p:txBody>
+      </p:sp>
     </p:spTree>
     <p:extLst>
       <p:ext uri="{BB962C8B-B14F-4D97-AF65-F5344CB8AC3E}">
@@ -4521,9 +4645,303 @@
   <p:timing>
     <p:tnLst>
       <p:par>
-        <p:cTn id="1" dur="indefinite" restart="never" nodeType="tmRoot"/>
+        <p:cTn id="1" dur="indefinite" restart="never" nodeType="tmRoot">
+          <p:childTnLst>
+            <p:seq concurrent="1" nextAc="seek">
+              <p:cTn id="2" dur="indefinite" nodeType="mainSeq">
+                <p:childTnLst>
+                  <p:par>
+                    <p:cTn id="3" fill="hold">
+                      <p:stCondLst>
+                        <p:cond delay="indefinite"/>
+                        <p:cond evt="onBegin" delay="0">
+                          <p:tn val="2"/>
+                        </p:cond>
+                      </p:stCondLst>
+                      <p:childTnLst>
+                        <p:par>
+                          <p:cTn id="4" fill="hold">
+                            <p:stCondLst>
+                              <p:cond delay="0"/>
+                            </p:stCondLst>
+                            <p:childTnLst>
+                              <p:par>
+                                <p:cTn id="5" presetID="1" presetClass="entr" presetSubtype="0" fill="hold" grpId="0" nodeType="withEffect">
+                                  <p:stCondLst>
+                                    <p:cond delay="0"/>
+                                  </p:stCondLst>
+                                  <p:childTnLst>
+                                    <p:set>
+                                      <p:cBhvr>
+                                        <p:cTn id="6" dur="1" fill="hold">
+                                          <p:stCondLst>
+                                            <p:cond delay="0"/>
+                                          </p:stCondLst>
+                                        </p:cTn>
+                                        <p:tgtEl>
+                                          <p:spTgt spid="3">
+                                            <p:txEl>
+                                              <p:pRg st="0" end="0"/>
+                                            </p:txEl>
+                                          </p:spTgt>
+                                        </p:tgtEl>
+                                        <p:attrNameLst>
+                                          <p:attrName>style.visibility</p:attrName>
+                                        </p:attrNameLst>
+                                      </p:cBhvr>
+                                      <p:to>
+                                        <p:strVal val="visible"/>
+                                      </p:to>
+                                    </p:set>
+                                  </p:childTnLst>
+                                </p:cTn>
+                              </p:par>
+                              <p:par>
+                                <p:cTn id="7" presetID="1" presetClass="entr" presetSubtype="0" fill="hold" grpId="0" nodeType="withEffect">
+                                  <p:stCondLst>
+                                    <p:cond delay="0"/>
+                                  </p:stCondLst>
+                                  <p:childTnLst>
+                                    <p:set>
+                                      <p:cBhvr>
+                                        <p:cTn id="8" dur="1" fill="hold">
+                                          <p:stCondLst>
+                                            <p:cond delay="0"/>
+                                          </p:stCondLst>
+                                        </p:cTn>
+                                        <p:tgtEl>
+                                          <p:spTgt spid="5"/>
+                                        </p:tgtEl>
+                                        <p:attrNameLst>
+                                          <p:attrName>style.visibility</p:attrName>
+                                        </p:attrNameLst>
+                                      </p:cBhvr>
+                                      <p:to>
+                                        <p:strVal val="visible"/>
+                                      </p:to>
+                                    </p:set>
+                                  </p:childTnLst>
+                                </p:cTn>
+                              </p:par>
+                            </p:childTnLst>
+                          </p:cTn>
+                        </p:par>
+                      </p:childTnLst>
+                    </p:cTn>
+                  </p:par>
+                  <p:par>
+                    <p:cTn id="9" fill="hold">
+                      <p:stCondLst>
+                        <p:cond delay="indefinite"/>
+                      </p:stCondLst>
+                      <p:childTnLst>
+                        <p:par>
+                          <p:cTn id="10" fill="hold">
+                            <p:stCondLst>
+                              <p:cond delay="0"/>
+                            </p:stCondLst>
+                            <p:childTnLst>
+                              <p:par>
+                                <p:cTn id="11" presetID="1" presetClass="entr" presetSubtype="0" fill="hold" grpId="0" nodeType="clickEffect">
+                                  <p:stCondLst>
+                                    <p:cond delay="0"/>
+                                  </p:stCondLst>
+                                  <p:childTnLst>
+                                    <p:set>
+                                      <p:cBhvr>
+                                        <p:cTn id="12" dur="1" fill="hold">
+                                          <p:stCondLst>
+                                            <p:cond delay="0"/>
+                                          </p:stCondLst>
+                                        </p:cTn>
+                                        <p:tgtEl>
+                                          <p:spTgt spid="3">
+                                            <p:txEl>
+                                              <p:pRg st="3" end="3"/>
+                                            </p:txEl>
+                                          </p:spTgt>
+                                        </p:tgtEl>
+                                        <p:attrNameLst>
+                                          <p:attrName>style.visibility</p:attrName>
+                                        </p:attrNameLst>
+                                      </p:cBhvr>
+                                      <p:to>
+                                        <p:strVal val="visible"/>
+                                      </p:to>
+                                    </p:set>
+                                  </p:childTnLst>
+                                </p:cTn>
+                              </p:par>
+                              <p:par>
+                                <p:cTn id="13" presetID="1" presetClass="entr" presetSubtype="0" fill="hold" grpId="0" nodeType="withEffect">
+                                  <p:stCondLst>
+                                    <p:cond delay="0"/>
+                                  </p:stCondLst>
+                                  <p:childTnLst>
+                                    <p:set>
+                                      <p:cBhvr>
+                                        <p:cTn id="14" dur="1" fill="hold">
+                                          <p:stCondLst>
+                                            <p:cond delay="0"/>
+                                          </p:stCondLst>
+                                        </p:cTn>
+                                        <p:tgtEl>
+                                          <p:spTgt spid="3">
+                                            <p:txEl>
+                                              <p:pRg st="4" end="4"/>
+                                            </p:txEl>
+                                          </p:spTgt>
+                                        </p:tgtEl>
+                                        <p:attrNameLst>
+                                          <p:attrName>style.visibility</p:attrName>
+                                        </p:attrNameLst>
+                                      </p:cBhvr>
+                                      <p:to>
+                                        <p:strVal val="visible"/>
+                                      </p:to>
+                                    </p:set>
+                                  </p:childTnLst>
+                                </p:cTn>
+                              </p:par>
+                              <p:par>
+                                <p:cTn id="15" presetID="1" presetClass="entr" presetSubtype="0" fill="hold" grpId="0" nodeType="withEffect">
+                                  <p:stCondLst>
+                                    <p:cond delay="0"/>
+                                  </p:stCondLst>
+                                  <p:childTnLst>
+                                    <p:set>
+                                      <p:cBhvr>
+                                        <p:cTn id="16" dur="1" fill="hold">
+                                          <p:stCondLst>
+                                            <p:cond delay="0"/>
+                                          </p:stCondLst>
+                                        </p:cTn>
+                                        <p:tgtEl>
+                                          <p:spTgt spid="3">
+                                            <p:txEl>
+                                              <p:pRg st="5" end="5"/>
+                                            </p:txEl>
+                                          </p:spTgt>
+                                        </p:tgtEl>
+                                        <p:attrNameLst>
+                                          <p:attrName>style.visibility</p:attrName>
+                                        </p:attrNameLst>
+                                      </p:cBhvr>
+                                      <p:to>
+                                        <p:strVal val="visible"/>
+                                      </p:to>
+                                    </p:set>
+                                  </p:childTnLst>
+                                </p:cTn>
+                              </p:par>
+                            </p:childTnLst>
+                          </p:cTn>
+                        </p:par>
+                      </p:childTnLst>
+                    </p:cTn>
+                  </p:par>
+                  <p:par>
+                    <p:cTn id="17" fill="hold">
+                      <p:stCondLst>
+                        <p:cond delay="indefinite"/>
+                      </p:stCondLst>
+                      <p:childTnLst>
+                        <p:par>
+                          <p:cTn id="18" fill="hold">
+                            <p:stCondLst>
+                              <p:cond delay="0"/>
+                            </p:stCondLst>
+                            <p:childTnLst>
+                              <p:par>
+                                <p:cTn id="19" presetID="1" presetClass="entr" presetSubtype="0" fill="hold" grpId="0" nodeType="clickEffect">
+                                  <p:stCondLst>
+                                    <p:cond delay="0"/>
+                                  </p:stCondLst>
+                                  <p:childTnLst>
+                                    <p:set>
+                                      <p:cBhvr>
+                                        <p:cTn id="20" dur="1" fill="hold">
+                                          <p:stCondLst>
+                                            <p:cond delay="0"/>
+                                          </p:stCondLst>
+                                        </p:cTn>
+                                        <p:tgtEl>
+                                          <p:spTgt spid="3">
+                                            <p:txEl>
+                                              <p:pRg st="6" end="6"/>
+                                            </p:txEl>
+                                          </p:spTgt>
+                                        </p:tgtEl>
+                                        <p:attrNameLst>
+                                          <p:attrName>style.visibility</p:attrName>
+                                        </p:attrNameLst>
+                                      </p:cBhvr>
+                                      <p:to>
+                                        <p:strVal val="visible"/>
+                                      </p:to>
+                                    </p:set>
+                                  </p:childTnLst>
+                                </p:cTn>
+                              </p:par>
+                              <p:par>
+                                <p:cTn id="21" presetID="1" presetClass="entr" presetSubtype="0" fill="hold" grpId="0" nodeType="withEffect">
+                                  <p:stCondLst>
+                                    <p:cond delay="0"/>
+                                  </p:stCondLst>
+                                  <p:childTnLst>
+                                    <p:set>
+                                      <p:cBhvr>
+                                        <p:cTn id="22" dur="1" fill="hold">
+                                          <p:stCondLst>
+                                            <p:cond delay="0"/>
+                                          </p:stCondLst>
+                                        </p:cTn>
+                                        <p:tgtEl>
+                                          <p:spTgt spid="6"/>
+                                        </p:tgtEl>
+                                        <p:attrNameLst>
+                                          <p:attrName>style.visibility</p:attrName>
+                                        </p:attrNameLst>
+                                      </p:cBhvr>
+                                      <p:to>
+                                        <p:strVal val="visible"/>
+                                      </p:to>
+                                    </p:set>
+                                  </p:childTnLst>
+                                </p:cTn>
+                              </p:par>
+                            </p:childTnLst>
+                          </p:cTn>
+                        </p:par>
+                      </p:childTnLst>
+                    </p:cTn>
+                  </p:par>
+                </p:childTnLst>
+              </p:cTn>
+              <p:prevCondLst>
+                <p:cond evt="onPrev" delay="0">
+                  <p:tgtEl>
+                    <p:sldTgt/>
+                  </p:tgtEl>
+                </p:cond>
+              </p:prevCondLst>
+              <p:nextCondLst>
+                <p:cond evt="onNext" delay="0">
+                  <p:tgtEl>
+                    <p:sldTgt/>
+                  </p:tgtEl>
+                </p:cond>
+              </p:nextCondLst>
+            </p:seq>
+          </p:childTnLst>
+        </p:cTn>
       </p:par>
     </p:tnLst>
+    <p:bldLst>
+      <p:bldP spid="3" grpId="0" uiExpand="1" build="p"/>
+      <p:bldP spid="5" grpId="0" animBg="1"/>
+      <p:bldP spid="6" grpId="0" animBg="1"/>
+    </p:bldLst>
   </p:timing>
 </p:sld>
 </file>

</xml_diff>

<commit_message>
Added slides on error handling
</commit_message>
<xml_diff>
--- a/CPlusPlus/03_essential_cpp_mod.pptx
+++ b/CPlusPlus/03_essential_cpp_mod.pptx
@@ -5,7 +5,7 @@
     <p:sldMasterId id="2147483660" r:id="rId1"/>
   </p:sldMasterIdLst>
   <p:notesMasterIdLst>
-    <p:notesMasterId r:id="rId19"/>
+    <p:notesMasterId r:id="rId21"/>
   </p:notesMasterIdLst>
   <p:sldIdLst>
     <p:sldId id="257" r:id="rId2"/>
@@ -25,6 +25,8 @@
     <p:sldId id="273" r:id="rId16"/>
     <p:sldId id="274" r:id="rId17"/>
     <p:sldId id="275" r:id="rId18"/>
+    <p:sldId id="276" r:id="rId19"/>
+    <p:sldId id="277" r:id="rId20"/>
   </p:sldIdLst>
   <p:sldSz cx="9144000" cy="6858000" type="screen4x3"/>
   <p:notesSz cx="6858000" cy="9144000"/>
@@ -7478,7 +7480,7 @@
           <a:p>
             <a:r>
               <a:rPr lang="en-US" dirty="0" smtClean="0"/>
-              <a:t>Exceptions</a:t>
+              <a:t>Error handling</a:t>
             </a:r>
             <a:endParaRPr lang="en-US" dirty="0"/>
           </a:p>
@@ -7623,8 +7625,30 @@
             <a:pPr lvl="1"/>
             <a:r>
               <a:rPr lang="en-US" dirty="0" smtClean="0"/>
-              <a:t>valid state of object?</a:t>
-            </a:r>
+              <a:t>valid state of object</a:t>
+            </a:r>
+            <a:r>
+              <a:rPr lang="en-US" dirty="0" smtClean="0"/>
+              <a:t>?</a:t>
+            </a:r>
+          </a:p>
+          <a:p>
+            <a:r>
+              <a:rPr lang="en-US" dirty="0" smtClean="0"/>
+              <a:t>Check for runtime problems</a:t>
+            </a:r>
+          </a:p>
+          <a:p>
+            <a:pPr lvl="1"/>
+            <a:r>
+              <a:rPr lang="en-US" dirty="0" smtClean="0"/>
+              <a:t>e.g., opening </a:t>
+            </a:r>
+            <a:r>
+              <a:rPr lang="en-US" dirty="0" smtClean="0"/>
+              <a:t>files</a:t>
+            </a:r>
+            <a:endParaRPr lang="en-US" dirty="0" smtClean="0"/>
           </a:p>
           <a:p>
             <a:r>
@@ -7673,7 +7697,7 @@
         </p:nvSpPr>
         <p:spPr>
           <a:xfrm>
-            <a:off x="3048000" y="5132439"/>
+            <a:off x="2861187" y="5653743"/>
             <a:ext cx="2869825" cy="523220"/>
           </a:xfrm>
           <a:prstGeom prst="rect">
@@ -7987,6 +8011,86 @@
                                           </p:stCondLst>
                                         </p:cTn>
                                         <p:tgtEl>
+                                          <p:spTgt spid="3">
+                                            <p:txEl>
+                                              <p:pRg st="6" end="6"/>
+                                            </p:txEl>
+                                          </p:spTgt>
+                                        </p:tgtEl>
+                                        <p:attrNameLst>
+                                          <p:attrName>style.visibility</p:attrName>
+                                        </p:attrNameLst>
+                                      </p:cBhvr>
+                                      <p:to>
+                                        <p:strVal val="visible"/>
+                                      </p:to>
+                                    </p:set>
+                                  </p:childTnLst>
+                                </p:cTn>
+                              </p:par>
+                              <p:par>
+                                <p:cTn id="25" presetID="1" presetClass="entr" presetSubtype="0" fill="hold" grpId="0" nodeType="withEffect">
+                                  <p:stCondLst>
+                                    <p:cond delay="0"/>
+                                  </p:stCondLst>
+                                  <p:childTnLst>
+                                    <p:set>
+                                      <p:cBhvr>
+                                        <p:cTn id="26" dur="1" fill="hold">
+                                          <p:stCondLst>
+                                            <p:cond delay="0"/>
+                                          </p:stCondLst>
+                                        </p:cTn>
+                                        <p:tgtEl>
+                                          <p:spTgt spid="3">
+                                            <p:txEl>
+                                              <p:pRg st="7" end="7"/>
+                                            </p:txEl>
+                                          </p:spTgt>
+                                        </p:tgtEl>
+                                        <p:attrNameLst>
+                                          <p:attrName>style.visibility</p:attrName>
+                                        </p:attrNameLst>
+                                      </p:cBhvr>
+                                      <p:to>
+                                        <p:strVal val="visible"/>
+                                      </p:to>
+                                    </p:set>
+                                  </p:childTnLst>
+                                </p:cTn>
+                              </p:par>
+                            </p:childTnLst>
+                          </p:cTn>
+                        </p:par>
+                      </p:childTnLst>
+                    </p:cTn>
+                  </p:par>
+                  <p:par>
+                    <p:cTn id="27" fill="hold">
+                      <p:stCondLst>
+                        <p:cond delay="indefinite"/>
+                      </p:stCondLst>
+                      <p:childTnLst>
+                        <p:par>
+                          <p:cTn id="28" fill="hold">
+                            <p:stCondLst>
+                              <p:cond delay="0"/>
+                            </p:stCondLst>
+                            <p:childTnLst>
+                              <p:par>
+                                <p:cTn id="29" presetID="1" presetClass="entr" presetSubtype="0" fill="hold" grpId="0" nodeType="clickEffect">
+                                  <p:stCondLst>
+                                    <p:cond delay="0"/>
+                                  </p:stCondLst>
+                                  <p:childTnLst>
+                                    <p:set>
+                                      <p:cBhvr>
+                                        <p:cTn id="30" dur="1" fill="hold">
+                                          <p:stCondLst>
+                                            <p:cond delay="0"/>
+                                          </p:stCondLst>
+                                        </p:cTn>
+                                        <p:tgtEl>
                                           <p:spTgt spid="5"/>
                                         </p:tgtEl>
                                         <p:attrNameLst>
@@ -8321,10 +8425,6 @@
               </a:rPr>
               <a:t>}</a:t>
             </a:r>
-            <a:endParaRPr lang="nn-NO" sz="1600" dirty="0">
-              <a:latin typeface="Courier New" pitchFamily="49" charset="0"/>
-              <a:cs typeface="Courier New" pitchFamily="49" charset="0"/>
-            </a:endParaRPr>
           </a:p>
         </p:txBody>
       </p:sp>
@@ -8834,6 +8934,71 @@
       </p:sp>
       <p:sp>
         <p:nvSpPr>
+          <p:cNvPr id="9" name="Content Placeholder 8"/>
+          <p:cNvSpPr>
+            <a:spLocks noGrp="1"/>
+          </p:cNvSpPr>
+          <p:nvPr>
+            <p:ph idx="1"/>
+          </p:nvPr>
+        </p:nvSpPr>
+        <p:spPr>
+          <a:xfrm>
+            <a:off x="628650" y="4161376"/>
+            <a:ext cx="7886700" cy="2015587"/>
+          </a:xfrm>
+        </p:spPr>
+        <p:txBody>
+          <a:bodyPr/>
+          <a:lstStyle/>
+          <a:p>
+            <a:r>
+              <a:rPr lang="en-US" dirty="0" smtClean="0"/>
+              <a:t>Multiple </a:t>
+            </a:r>
+            <a:r>
+              <a:rPr lang="en-US" dirty="0" smtClean="0">
+                <a:latin typeface="Courier New" panose="02070309020205020404" pitchFamily="49" charset="0"/>
+                <a:cs typeface="Courier New" panose="02070309020205020404" pitchFamily="49" charset="0"/>
+              </a:rPr>
+              <a:t>catch</a:t>
+            </a:r>
+            <a:r>
+              <a:rPr lang="en-US" dirty="0" smtClean="0"/>
+              <a:t> phrase are possible</a:t>
+            </a:r>
+          </a:p>
+          <a:p>
+            <a:r>
+              <a:rPr lang="en-US" dirty="0" smtClean="0"/>
+              <a:t>Exception can be </a:t>
+            </a:r>
+            <a:r>
+              <a:rPr lang="en-US" dirty="0" err="1" smtClean="0"/>
+              <a:t>rethrown</a:t>
+            </a:r>
+            <a:r>
+              <a:rPr lang="en-US" dirty="0" smtClean="0"/>
+              <a:t> with </a:t>
+            </a:r>
+            <a:r>
+              <a:rPr lang="en-US" dirty="0" smtClean="0">
+                <a:latin typeface="Courier New" panose="02070309020205020404" pitchFamily="49" charset="0"/>
+                <a:cs typeface="Courier New" panose="02070309020205020404" pitchFamily="49" charset="0"/>
+              </a:rPr>
+              <a:t>throw;</a:t>
+            </a:r>
+          </a:p>
+          <a:p>
+            <a:r>
+              <a:rPr lang="en-US" dirty="0" smtClean="0"/>
+              <a:t>Recover from exception if possible</a:t>
+            </a:r>
+          </a:p>
+        </p:txBody>
+      </p:sp>
+      <p:sp>
+        <p:nvSpPr>
           <p:cNvPr id="3" name="Slide Number Placeholder 2"/>
           <p:cNvSpPr>
             <a:spLocks noGrp="1"/>
@@ -8864,7 +9029,7 @@
         <p:spPr>
           <a:xfrm>
             <a:off x="1680704" y="1894981"/>
-            <a:ext cx="6971685" cy="1815882"/>
+            <a:ext cx="6971685" cy="2062103"/>
           </a:xfrm>
           <a:prstGeom prst="rect">
             <a:avLst/>
@@ -9014,7 +9179,14 @@
                 <a:latin typeface="Courier New" pitchFamily="49" charset="0"/>
                 <a:cs typeface="Courier New" pitchFamily="49" charset="0"/>
               </a:rPr>
-              <a:t>   terminate();</a:t>
+              <a:t>   </a:t>
+            </a:r>
+            <a:r>
+              <a:rPr lang="nn-NO" sz="1600" dirty="0" smtClean="0">
+                <a:latin typeface="Courier New" pitchFamily="49" charset="0"/>
+                <a:cs typeface="Courier New" pitchFamily="49" charset="0"/>
+              </a:rPr>
+              <a:t>exit(1);</a:t>
             </a:r>
             <a:endParaRPr lang="nn-NO" sz="1600" dirty="0">
               <a:latin typeface="Courier New" pitchFamily="49" charset="0"/>
@@ -9029,6 +9201,15 @@
               </a:rPr>
               <a:t>}</a:t>
             </a:r>
+          </a:p>
+          <a:p>
+            <a:r>
+              <a:rPr lang="fr-FR" sz="1600" dirty="0">
+                <a:latin typeface="Courier New" pitchFamily="49" charset="0"/>
+                <a:cs typeface="Courier New" pitchFamily="49" charset="0"/>
+              </a:rPr>
+              <a:t>…</a:t>
+            </a:r>
             <a:endParaRPr lang="nn-NO" sz="1600" dirty="0">
               <a:latin typeface="Courier New" pitchFamily="49" charset="0"/>
               <a:cs typeface="Courier New" pitchFamily="49" charset="0"/>
@@ -9036,6 +9217,240 @@
           </a:p>
         </p:txBody>
       </p:sp>
+      <p:grpSp>
+        <p:nvGrpSpPr>
+          <p:cNvPr id="5" name="Group 4"/>
+          <p:cNvGrpSpPr/>
+          <p:nvPr/>
+        </p:nvGrpSpPr>
+        <p:grpSpPr>
+          <a:xfrm>
+            <a:off x="4134159" y="3202996"/>
+            <a:ext cx="3716902" cy="608652"/>
+            <a:chOff x="1267762" y="2600597"/>
+            <a:chExt cx="3716902" cy="608652"/>
+          </a:xfrm>
+        </p:grpSpPr>
+        <p:sp>
+          <p:nvSpPr>
+            <p:cNvPr id="6" name="TextBox 5"/>
+            <p:cNvSpPr txBox="1"/>
+            <p:nvPr/>
+          </p:nvSpPr>
+          <p:spPr>
+            <a:xfrm>
+              <a:off x="2762059" y="2809139"/>
+              <a:ext cx="2222605" cy="400110"/>
+            </a:xfrm>
+            <a:prstGeom prst="rect">
+              <a:avLst/>
+            </a:prstGeom>
+            <a:solidFill>
+              <a:schemeClr val="bg1"/>
+            </a:solidFill>
+            <a:ln w="19050">
+              <a:solidFill>
+                <a:schemeClr val="tx1"/>
+              </a:solidFill>
+            </a:ln>
+          </p:spPr>
+          <p:txBody>
+            <a:bodyPr wrap="square" rtlCol="0">
+              <a:spAutoFit/>
+            </a:bodyPr>
+            <a:lstStyle/>
+            <a:p>
+              <a:r>
+                <a:rPr lang="en-US" sz="2000" dirty="0" smtClean="0"/>
+                <a:t>deal with situation</a:t>
+              </a:r>
+              <a:endParaRPr lang="en-US" sz="2000" dirty="0">
+                <a:latin typeface="Courier New" panose="02070309020205020404" pitchFamily="49" charset="0"/>
+                <a:cs typeface="Courier New" panose="02070309020205020404" pitchFamily="49" charset="0"/>
+              </a:endParaRPr>
+            </a:p>
+          </p:txBody>
+        </p:sp>
+        <p:cxnSp>
+          <p:nvCxnSpPr>
+            <p:cNvPr id="7" name="Straight Arrow Connector 6"/>
+            <p:cNvCxnSpPr>
+              <a:stCxn id="6" idx="1"/>
+            </p:cNvCxnSpPr>
+            <p:nvPr/>
+          </p:nvCxnSpPr>
+          <p:spPr>
+            <a:xfrm flipH="1" flipV="1">
+              <a:off x="1267762" y="2600597"/>
+              <a:ext cx="1494297" cy="408597"/>
+            </a:xfrm>
+            <a:prstGeom prst="straightConnector1">
+              <a:avLst/>
+            </a:prstGeom>
+            <a:ln w="19050">
+              <a:solidFill>
+                <a:schemeClr val="tx1"/>
+              </a:solidFill>
+              <a:tailEnd type="stealth" w="lg" len="lg"/>
+            </a:ln>
+          </p:spPr>
+          <p:style>
+            <a:lnRef idx="1">
+              <a:schemeClr val="accent1"/>
+            </a:lnRef>
+            <a:fillRef idx="0">
+              <a:schemeClr val="accent1"/>
+            </a:fillRef>
+            <a:effectRef idx="0">
+              <a:schemeClr val="accent1"/>
+            </a:effectRef>
+            <a:fontRef idx="minor">
+              <a:schemeClr val="tx1"/>
+            </a:fontRef>
+          </p:style>
+        </p:cxnSp>
+      </p:grpSp>
+      <p:sp>
+        <p:nvSpPr>
+          <p:cNvPr id="8" name="TextBox 7"/>
+          <p:cNvSpPr txBox="1"/>
+          <p:nvPr/>
+        </p:nvSpPr>
+        <p:spPr>
+          <a:xfrm>
+            <a:off x="3388131" y="1951992"/>
+            <a:ext cx="5621604" cy="400110"/>
+          </a:xfrm>
+          <a:prstGeom prst="rect">
+            <a:avLst/>
+          </a:prstGeom>
+          <a:solidFill>
+            <a:schemeClr val="bg1"/>
+          </a:solidFill>
+          <a:ln>
+            <a:solidFill>
+              <a:schemeClr val="tx1"/>
+            </a:solidFill>
+          </a:ln>
+        </p:spPr>
+        <p:txBody>
+          <a:bodyPr wrap="none" rtlCol="0">
+            <a:spAutoFit/>
+          </a:bodyPr>
+          <a:lstStyle/>
+          <a:p>
+            <a:r>
+              <a:rPr lang="en-US" sz="2000" dirty="0" smtClean="0"/>
+              <a:t>Note: only </a:t>
+            </a:r>
+            <a:r>
+              <a:rPr lang="en-US" sz="2000" dirty="0" err="1" smtClean="0">
+                <a:latin typeface="Courier New" panose="02070309020205020404" pitchFamily="49" charset="0"/>
+                <a:cs typeface="Courier New" panose="02070309020205020404" pitchFamily="49" charset="0"/>
+              </a:rPr>
+              <a:t>invalid_argument</a:t>
+            </a:r>
+            <a:r>
+              <a:rPr lang="en-US" sz="2000" dirty="0" smtClean="0"/>
+              <a:t> exception caught</a:t>
+            </a:r>
+            <a:endParaRPr lang="en-US" sz="2000" dirty="0"/>
+          </a:p>
+        </p:txBody>
+      </p:sp>
+      <p:grpSp>
+        <p:nvGrpSpPr>
+          <p:cNvPr id="10" name="Group 9"/>
+          <p:cNvGrpSpPr/>
+          <p:nvPr/>
+        </p:nvGrpSpPr>
+        <p:grpSpPr>
+          <a:xfrm>
+            <a:off x="264496" y="2371511"/>
+            <a:ext cx="1829774" cy="400110"/>
+            <a:chOff x="2762059" y="1769112"/>
+            <a:chExt cx="1829774" cy="400110"/>
+          </a:xfrm>
+        </p:grpSpPr>
+        <p:sp>
+          <p:nvSpPr>
+            <p:cNvPr id="11" name="TextBox 10"/>
+            <p:cNvSpPr txBox="1"/>
+            <p:nvPr/>
+          </p:nvSpPr>
+          <p:spPr>
+            <a:xfrm>
+              <a:off x="2762059" y="1769112"/>
+              <a:ext cx="1058862" cy="400110"/>
+            </a:xfrm>
+            <a:prstGeom prst="rect">
+              <a:avLst/>
+            </a:prstGeom>
+            <a:solidFill>
+              <a:schemeClr val="bg1"/>
+            </a:solidFill>
+            <a:ln w="19050">
+              <a:solidFill>
+                <a:schemeClr val="tx1"/>
+              </a:solidFill>
+            </a:ln>
+          </p:spPr>
+          <p:txBody>
+            <a:bodyPr wrap="square" rtlCol="0">
+              <a:spAutoFit/>
+            </a:bodyPr>
+            <a:lstStyle/>
+            <a:p>
+              <a:r>
+                <a:rPr lang="en-US" sz="2000" dirty="0" smtClean="0"/>
+                <a:t>execute</a:t>
+              </a:r>
+              <a:endParaRPr lang="en-US" sz="2000" dirty="0">
+                <a:latin typeface="Courier New" panose="02070309020205020404" pitchFamily="49" charset="0"/>
+                <a:cs typeface="Courier New" panose="02070309020205020404" pitchFamily="49" charset="0"/>
+              </a:endParaRPr>
+            </a:p>
+          </p:txBody>
+        </p:sp>
+        <p:cxnSp>
+          <p:nvCxnSpPr>
+            <p:cNvPr id="12" name="Straight Arrow Connector 11"/>
+            <p:cNvCxnSpPr>
+              <a:stCxn id="11" idx="3"/>
+            </p:cNvCxnSpPr>
+            <p:nvPr/>
+          </p:nvCxnSpPr>
+          <p:spPr>
+            <a:xfrm>
+              <a:off x="3820921" y="1969167"/>
+              <a:ext cx="770912" cy="0"/>
+            </a:xfrm>
+            <a:prstGeom prst="straightConnector1">
+              <a:avLst/>
+            </a:prstGeom>
+            <a:ln w="19050">
+              <a:solidFill>
+                <a:schemeClr val="tx1"/>
+              </a:solidFill>
+              <a:tailEnd type="stealth" w="lg" len="lg"/>
+            </a:ln>
+          </p:spPr>
+          <p:style>
+            <a:lnRef idx="1">
+              <a:schemeClr val="accent1"/>
+            </a:lnRef>
+            <a:fillRef idx="0">
+              <a:schemeClr val="accent1"/>
+            </a:fillRef>
+            <a:effectRef idx="0">
+              <a:schemeClr val="accent1"/>
+            </a:effectRef>
+            <a:fontRef idx="minor">
+              <a:schemeClr val="tx1"/>
+            </a:fontRef>
+          </p:style>
+        </p:cxnSp>
+      </p:grpSp>
     </p:spTree>
     <p:extLst>
       <p:ext uri="{BB962C8B-B14F-4D97-AF65-F5344CB8AC3E}">
@@ -9049,9 +9464,1456 @@
   <p:timing>
     <p:tnLst>
       <p:par>
-        <p:cTn id="1" dur="indefinite" restart="never" nodeType="tmRoot"/>
+        <p:cTn id="1" dur="indefinite" restart="never" nodeType="tmRoot">
+          <p:childTnLst>
+            <p:seq concurrent="1" nextAc="seek">
+              <p:cTn id="2" dur="indefinite" nodeType="mainSeq">
+                <p:childTnLst>
+                  <p:par>
+                    <p:cTn id="3" fill="hold">
+                      <p:stCondLst>
+                        <p:cond delay="indefinite"/>
+                      </p:stCondLst>
+                      <p:childTnLst>
+                        <p:par>
+                          <p:cTn id="4" fill="hold">
+                            <p:stCondLst>
+                              <p:cond delay="0"/>
+                            </p:stCondLst>
+                            <p:childTnLst>
+                              <p:par>
+                                <p:cTn id="5" presetID="1" presetClass="entr" presetSubtype="0" fill="hold" nodeType="clickEffect">
+                                  <p:stCondLst>
+                                    <p:cond delay="0"/>
+                                  </p:stCondLst>
+                                  <p:childTnLst>
+                                    <p:set>
+                                      <p:cBhvr>
+                                        <p:cTn id="6" dur="1" fill="hold">
+                                          <p:stCondLst>
+                                            <p:cond delay="0"/>
+                                          </p:stCondLst>
+                                        </p:cTn>
+                                        <p:tgtEl>
+                                          <p:spTgt spid="10"/>
+                                        </p:tgtEl>
+                                        <p:attrNameLst>
+                                          <p:attrName>style.visibility</p:attrName>
+                                        </p:attrNameLst>
+                                      </p:cBhvr>
+                                      <p:to>
+                                        <p:strVal val="visible"/>
+                                      </p:to>
+                                    </p:set>
+                                  </p:childTnLst>
+                                </p:cTn>
+                              </p:par>
+                            </p:childTnLst>
+                          </p:cTn>
+                        </p:par>
+                      </p:childTnLst>
+                    </p:cTn>
+                  </p:par>
+                  <p:par>
+                    <p:cTn id="7" fill="hold">
+                      <p:stCondLst>
+                        <p:cond delay="indefinite"/>
+                      </p:stCondLst>
+                      <p:childTnLst>
+                        <p:par>
+                          <p:cTn id="8" fill="hold">
+                            <p:stCondLst>
+                              <p:cond delay="0"/>
+                            </p:stCondLst>
+                            <p:childTnLst>
+                              <p:par>
+                                <p:cTn id="9" presetID="1" presetClass="entr" presetSubtype="0" fill="hold" nodeType="clickEffect">
+                                  <p:stCondLst>
+                                    <p:cond delay="0"/>
+                                  </p:stCondLst>
+                                  <p:childTnLst>
+                                    <p:set>
+                                      <p:cBhvr>
+                                        <p:cTn id="10" dur="1" fill="hold">
+                                          <p:stCondLst>
+                                            <p:cond delay="0"/>
+                                          </p:stCondLst>
+                                        </p:cTn>
+                                        <p:tgtEl>
+                                          <p:spTgt spid="5"/>
+                                        </p:tgtEl>
+                                        <p:attrNameLst>
+                                          <p:attrName>style.visibility</p:attrName>
+                                        </p:attrNameLst>
+                                      </p:cBhvr>
+                                      <p:to>
+                                        <p:strVal val="visible"/>
+                                      </p:to>
+                                    </p:set>
+                                  </p:childTnLst>
+                                </p:cTn>
+                              </p:par>
+                            </p:childTnLst>
+                          </p:cTn>
+                        </p:par>
+                      </p:childTnLst>
+                    </p:cTn>
+                  </p:par>
+                  <p:par>
+                    <p:cTn id="11" fill="hold">
+                      <p:stCondLst>
+                        <p:cond delay="indefinite"/>
+                      </p:stCondLst>
+                      <p:childTnLst>
+                        <p:par>
+                          <p:cTn id="12" fill="hold">
+                            <p:stCondLst>
+                              <p:cond delay="0"/>
+                            </p:stCondLst>
+                            <p:childTnLst>
+                              <p:par>
+                                <p:cTn id="13" presetID="1" presetClass="entr" presetSubtype="0" fill="hold" grpId="0" nodeType="clickEffect">
+                                  <p:stCondLst>
+                                    <p:cond delay="0"/>
+                                  </p:stCondLst>
+                                  <p:childTnLst>
+                                    <p:set>
+                                      <p:cBhvr>
+                                        <p:cTn id="14" dur="1" fill="hold">
+                                          <p:stCondLst>
+                                            <p:cond delay="0"/>
+                                          </p:stCondLst>
+                                        </p:cTn>
+                                        <p:tgtEl>
+                                          <p:spTgt spid="8"/>
+                                        </p:tgtEl>
+                                        <p:attrNameLst>
+                                          <p:attrName>style.visibility</p:attrName>
+                                        </p:attrNameLst>
+                                      </p:cBhvr>
+                                      <p:to>
+                                        <p:strVal val="visible"/>
+                                      </p:to>
+                                    </p:set>
+                                  </p:childTnLst>
+                                </p:cTn>
+                              </p:par>
+                            </p:childTnLst>
+                          </p:cTn>
+                        </p:par>
+                      </p:childTnLst>
+                    </p:cTn>
+                  </p:par>
+                  <p:par>
+                    <p:cTn id="15" fill="hold">
+                      <p:stCondLst>
+                        <p:cond delay="indefinite"/>
+                      </p:stCondLst>
+                      <p:childTnLst>
+                        <p:par>
+                          <p:cTn id="16" fill="hold">
+                            <p:stCondLst>
+                              <p:cond delay="0"/>
+                            </p:stCondLst>
+                            <p:childTnLst>
+                              <p:par>
+                                <p:cTn id="17" presetID="1" presetClass="entr" presetSubtype="0" fill="hold" grpId="0" nodeType="clickEffect">
+                                  <p:stCondLst>
+                                    <p:cond delay="0"/>
+                                  </p:stCondLst>
+                                  <p:childTnLst>
+                                    <p:set>
+                                      <p:cBhvr>
+                                        <p:cTn id="18" dur="1" fill="hold">
+                                          <p:stCondLst>
+                                            <p:cond delay="0"/>
+                                          </p:stCondLst>
+                                        </p:cTn>
+                                        <p:tgtEl>
+                                          <p:spTgt spid="9">
+                                            <p:txEl>
+                                              <p:pRg st="0" end="0"/>
+                                            </p:txEl>
+                                          </p:spTgt>
+                                        </p:tgtEl>
+                                        <p:attrNameLst>
+                                          <p:attrName>style.visibility</p:attrName>
+                                        </p:attrNameLst>
+                                      </p:cBhvr>
+                                      <p:to>
+                                        <p:strVal val="visible"/>
+                                      </p:to>
+                                    </p:set>
+                                  </p:childTnLst>
+                                </p:cTn>
+                              </p:par>
+                            </p:childTnLst>
+                          </p:cTn>
+                        </p:par>
+                      </p:childTnLst>
+                    </p:cTn>
+                  </p:par>
+                  <p:par>
+                    <p:cTn id="19" fill="hold">
+                      <p:stCondLst>
+                        <p:cond delay="indefinite"/>
+                      </p:stCondLst>
+                      <p:childTnLst>
+                        <p:par>
+                          <p:cTn id="20" fill="hold">
+                            <p:stCondLst>
+                              <p:cond delay="0"/>
+                            </p:stCondLst>
+                            <p:childTnLst>
+                              <p:par>
+                                <p:cTn id="21" presetID="1" presetClass="entr" presetSubtype="0" fill="hold" grpId="0" nodeType="clickEffect">
+                                  <p:stCondLst>
+                                    <p:cond delay="0"/>
+                                  </p:stCondLst>
+                                  <p:childTnLst>
+                                    <p:set>
+                                      <p:cBhvr>
+                                        <p:cTn id="22" dur="1" fill="hold">
+                                          <p:stCondLst>
+                                            <p:cond delay="0"/>
+                                          </p:stCondLst>
+                                        </p:cTn>
+                                        <p:tgtEl>
+                                          <p:spTgt spid="9">
+                                            <p:txEl>
+                                              <p:pRg st="1" end="1"/>
+                                            </p:txEl>
+                                          </p:spTgt>
+                                        </p:tgtEl>
+                                        <p:attrNameLst>
+                                          <p:attrName>style.visibility</p:attrName>
+                                        </p:attrNameLst>
+                                      </p:cBhvr>
+                                      <p:to>
+                                        <p:strVal val="visible"/>
+                                      </p:to>
+                                    </p:set>
+                                  </p:childTnLst>
+                                </p:cTn>
+                              </p:par>
+                            </p:childTnLst>
+                          </p:cTn>
+                        </p:par>
+                      </p:childTnLst>
+                    </p:cTn>
+                  </p:par>
+                  <p:par>
+                    <p:cTn id="23" fill="hold">
+                      <p:stCondLst>
+                        <p:cond delay="indefinite"/>
+                      </p:stCondLst>
+                      <p:childTnLst>
+                        <p:par>
+                          <p:cTn id="24" fill="hold">
+                            <p:stCondLst>
+                              <p:cond delay="0"/>
+                            </p:stCondLst>
+                            <p:childTnLst>
+                              <p:par>
+                                <p:cTn id="25" presetID="1" presetClass="entr" presetSubtype="0" fill="hold" grpId="0" nodeType="clickEffect">
+                                  <p:stCondLst>
+                                    <p:cond delay="0"/>
+                                  </p:stCondLst>
+                                  <p:childTnLst>
+                                    <p:set>
+                                      <p:cBhvr>
+                                        <p:cTn id="26" dur="1" fill="hold">
+                                          <p:stCondLst>
+                                            <p:cond delay="0"/>
+                                          </p:stCondLst>
+                                        </p:cTn>
+                                        <p:tgtEl>
+                                          <p:spTgt spid="9">
+                                            <p:txEl>
+                                              <p:pRg st="2" end="2"/>
+                                            </p:txEl>
+                                          </p:spTgt>
+                                        </p:tgtEl>
+                                        <p:attrNameLst>
+                                          <p:attrName>style.visibility</p:attrName>
+                                        </p:attrNameLst>
+                                      </p:cBhvr>
+                                      <p:to>
+                                        <p:strVal val="visible"/>
+                                      </p:to>
+                                    </p:set>
+                                  </p:childTnLst>
+                                </p:cTn>
+                              </p:par>
+                            </p:childTnLst>
+                          </p:cTn>
+                        </p:par>
+                      </p:childTnLst>
+                    </p:cTn>
+                  </p:par>
+                </p:childTnLst>
+              </p:cTn>
+              <p:prevCondLst>
+                <p:cond evt="onPrev" delay="0">
+                  <p:tgtEl>
+                    <p:sldTgt/>
+                  </p:tgtEl>
+                </p:cond>
+              </p:prevCondLst>
+              <p:nextCondLst>
+                <p:cond evt="onNext" delay="0">
+                  <p:tgtEl>
+                    <p:sldTgt/>
+                  </p:tgtEl>
+                </p:cond>
+              </p:nextCondLst>
+            </p:seq>
+          </p:childTnLst>
+        </p:cTn>
       </p:par>
     </p:tnLst>
+    <p:bldLst>
+      <p:bldP spid="9" grpId="0" build="p"/>
+      <p:bldP spid="8" grpId="0" animBg="1"/>
+    </p:bldLst>
+  </p:timing>
+</p:sld>
+</file>
+
+<file path=ppt/slides/slide18.xml><?xml version="1.0" encoding="utf-8"?>
+<p:sld xmlns:a="http://schemas.openxmlformats.org/drawingml/2006/main" xmlns:r="http://schemas.openxmlformats.org/officeDocument/2006/relationships" xmlns:p="http://schemas.openxmlformats.org/presentationml/2006/main">
+  <p:cSld>
+    <p:spTree>
+      <p:nvGrpSpPr>
+        <p:cNvPr id="1" name=""/>
+        <p:cNvGrpSpPr/>
+        <p:nvPr/>
+      </p:nvGrpSpPr>
+      <p:grpSpPr>
+        <a:xfrm>
+          <a:off x="0" y="0"/>
+          <a:ext cx="0" cy="0"/>
+          <a:chOff x="0" y="0"/>
+          <a:chExt cx="0" cy="0"/>
+        </a:xfrm>
+      </p:grpSpPr>
+      <p:sp>
+        <p:nvSpPr>
+          <p:cNvPr id="2" name="Title 1"/>
+          <p:cNvSpPr>
+            <a:spLocks noGrp="1"/>
+          </p:cNvSpPr>
+          <p:nvPr>
+            <p:ph type="title"/>
+          </p:nvPr>
+        </p:nvSpPr>
+        <p:spPr/>
+        <p:txBody>
+          <a:bodyPr/>
+          <a:lstStyle/>
+          <a:p>
+            <a:r>
+              <a:rPr lang="en-US" dirty="0" smtClean="0"/>
+              <a:t>Caveats</a:t>
+            </a:r>
+            <a:endParaRPr lang="en-US" dirty="0"/>
+          </a:p>
+        </p:txBody>
+      </p:sp>
+      <p:sp>
+        <p:nvSpPr>
+          <p:cNvPr id="3" name="Content Placeholder 2"/>
+          <p:cNvSpPr>
+            <a:spLocks noGrp="1"/>
+          </p:cNvSpPr>
+          <p:nvPr>
+            <p:ph idx="1"/>
+          </p:nvPr>
+        </p:nvSpPr>
+        <p:spPr/>
+        <p:txBody>
+          <a:bodyPr/>
+          <a:lstStyle/>
+          <a:p>
+            <a:r>
+              <a:rPr lang="en-US" dirty="0" smtClean="0"/>
+              <a:t>Good error handling is hard</a:t>
+            </a:r>
+          </a:p>
+          <a:p>
+            <a:pPr lvl="1"/>
+            <a:r>
+              <a:rPr lang="en-US" dirty="0" smtClean="0"/>
+              <a:t>handle error at right level</a:t>
+            </a:r>
+          </a:p>
+          <a:p>
+            <a:pPr lvl="1"/>
+            <a:r>
+              <a:rPr lang="en-US" dirty="0" smtClean="0"/>
+              <a:t>convey maximal information to user</a:t>
+            </a:r>
+          </a:p>
+          <a:p>
+            <a:r>
+              <a:rPr lang="en-US" dirty="0" smtClean="0"/>
+              <a:t>Increases size of code base considerably</a:t>
+            </a:r>
+          </a:p>
+          <a:p>
+            <a:r>
+              <a:rPr lang="en-US" dirty="0" smtClean="0"/>
+              <a:t>Think of corner cases</a:t>
+            </a:r>
+          </a:p>
+          <a:p>
+            <a:r>
+              <a:rPr lang="en-US" dirty="0" smtClean="0"/>
+              <a:t>Requires testing</a:t>
+            </a:r>
+            <a:endParaRPr lang="en-US" dirty="0"/>
+          </a:p>
+        </p:txBody>
+      </p:sp>
+      <p:sp>
+        <p:nvSpPr>
+          <p:cNvPr id="4" name="Slide Number Placeholder 3"/>
+          <p:cNvSpPr>
+            <a:spLocks noGrp="1"/>
+          </p:cNvSpPr>
+          <p:nvPr>
+            <p:ph type="sldNum" sz="quarter" idx="12"/>
+          </p:nvPr>
+        </p:nvSpPr>
+        <p:spPr/>
+        <p:txBody>
+          <a:bodyPr/>
+          <a:lstStyle/>
+          <a:p>
+            <a:fld id="{2F8BA72C-5DC7-4014-AC42-C5F5AAAF9B79}" type="slidenum">
+              <a:rPr lang="en-US" smtClean="0"/>
+              <a:t>18</a:t>
+            </a:fld>
+            <a:endParaRPr lang="en-US"/>
+          </a:p>
+        </p:txBody>
+      </p:sp>
+      <p:sp>
+        <p:nvSpPr>
+          <p:cNvPr id="5" name="TextBox 4"/>
+          <p:cNvSpPr txBox="1"/>
+          <p:nvPr/>
+        </p:nvSpPr>
+        <p:spPr>
+          <a:xfrm>
+            <a:off x="2290917" y="5053781"/>
+            <a:ext cx="3611630" cy="523220"/>
+          </a:xfrm>
+          <a:prstGeom prst="rect">
+            <a:avLst/>
+          </a:prstGeom>
+          <a:noFill/>
+          <a:ln>
+            <a:solidFill>
+              <a:schemeClr val="tx1"/>
+            </a:solidFill>
+          </a:ln>
+        </p:spPr>
+        <p:txBody>
+          <a:bodyPr wrap="none" rtlCol="0">
+            <a:spAutoFit/>
+          </a:bodyPr>
+          <a:lstStyle/>
+          <a:p>
+            <a:r>
+              <a:rPr lang="en-US" sz="2800" dirty="0" smtClean="0"/>
+              <a:t>Do it right, or not at all!</a:t>
+            </a:r>
+            <a:endParaRPr lang="en-US" sz="2800" dirty="0"/>
+          </a:p>
+        </p:txBody>
+      </p:sp>
+    </p:spTree>
+    <p:extLst>
+      <p:ext uri="{BB962C8B-B14F-4D97-AF65-F5344CB8AC3E}">
+        <p14:creationId xmlns:p14="http://schemas.microsoft.com/office/powerpoint/2010/main" val="3660664678"/>
+      </p:ext>
+    </p:extLst>
+  </p:cSld>
+  <p:clrMapOvr>
+    <a:masterClrMapping/>
+  </p:clrMapOvr>
+  <p:timing>
+    <p:tnLst>
+      <p:par>
+        <p:cTn id="1" dur="indefinite" restart="never" nodeType="tmRoot">
+          <p:childTnLst>
+            <p:seq concurrent="1" nextAc="seek">
+              <p:cTn id="2" dur="indefinite" nodeType="mainSeq">
+                <p:childTnLst>
+                  <p:par>
+                    <p:cTn id="3" fill="hold">
+                      <p:stCondLst>
+                        <p:cond delay="indefinite"/>
+                        <p:cond evt="onBegin" delay="0">
+                          <p:tn val="2"/>
+                        </p:cond>
+                      </p:stCondLst>
+                      <p:childTnLst>
+                        <p:par>
+                          <p:cTn id="4" fill="hold">
+                            <p:stCondLst>
+                              <p:cond delay="0"/>
+                            </p:stCondLst>
+                            <p:childTnLst>
+                              <p:par>
+                                <p:cTn id="5" presetID="1" presetClass="entr" presetSubtype="0" fill="hold" grpId="0" nodeType="withEffect">
+                                  <p:stCondLst>
+                                    <p:cond delay="0"/>
+                                  </p:stCondLst>
+                                  <p:childTnLst>
+                                    <p:set>
+                                      <p:cBhvr>
+                                        <p:cTn id="6" dur="1" fill="hold">
+                                          <p:stCondLst>
+                                            <p:cond delay="0"/>
+                                          </p:stCondLst>
+                                        </p:cTn>
+                                        <p:tgtEl>
+                                          <p:spTgt spid="3">
+                                            <p:txEl>
+                                              <p:pRg st="0" end="0"/>
+                                            </p:txEl>
+                                          </p:spTgt>
+                                        </p:tgtEl>
+                                        <p:attrNameLst>
+                                          <p:attrName>style.visibility</p:attrName>
+                                        </p:attrNameLst>
+                                      </p:cBhvr>
+                                      <p:to>
+                                        <p:strVal val="visible"/>
+                                      </p:to>
+                                    </p:set>
+                                  </p:childTnLst>
+                                </p:cTn>
+                              </p:par>
+                            </p:childTnLst>
+                          </p:cTn>
+                        </p:par>
+                      </p:childTnLst>
+                    </p:cTn>
+                  </p:par>
+                  <p:par>
+                    <p:cTn id="7" fill="hold">
+                      <p:stCondLst>
+                        <p:cond delay="indefinite"/>
+                      </p:stCondLst>
+                      <p:childTnLst>
+                        <p:par>
+                          <p:cTn id="8" fill="hold">
+                            <p:stCondLst>
+                              <p:cond delay="0"/>
+                            </p:stCondLst>
+                            <p:childTnLst>
+                              <p:par>
+                                <p:cTn id="9" presetID="1" presetClass="entr" presetSubtype="0" fill="hold" grpId="0" nodeType="clickEffect">
+                                  <p:stCondLst>
+                                    <p:cond delay="0"/>
+                                  </p:stCondLst>
+                                  <p:childTnLst>
+                                    <p:set>
+                                      <p:cBhvr>
+                                        <p:cTn id="10" dur="1" fill="hold">
+                                          <p:stCondLst>
+                                            <p:cond delay="0"/>
+                                          </p:stCondLst>
+                                        </p:cTn>
+                                        <p:tgtEl>
+                                          <p:spTgt spid="3">
+                                            <p:txEl>
+                                              <p:pRg st="1" end="1"/>
+                                            </p:txEl>
+                                          </p:spTgt>
+                                        </p:tgtEl>
+                                        <p:attrNameLst>
+                                          <p:attrName>style.visibility</p:attrName>
+                                        </p:attrNameLst>
+                                      </p:cBhvr>
+                                      <p:to>
+                                        <p:strVal val="visible"/>
+                                      </p:to>
+                                    </p:set>
+                                  </p:childTnLst>
+                                </p:cTn>
+                              </p:par>
+                            </p:childTnLst>
+                          </p:cTn>
+                        </p:par>
+                      </p:childTnLst>
+                    </p:cTn>
+                  </p:par>
+                  <p:par>
+                    <p:cTn id="11" fill="hold">
+                      <p:stCondLst>
+                        <p:cond delay="indefinite"/>
+                      </p:stCondLst>
+                      <p:childTnLst>
+                        <p:par>
+                          <p:cTn id="12" fill="hold">
+                            <p:stCondLst>
+                              <p:cond delay="0"/>
+                            </p:stCondLst>
+                            <p:childTnLst>
+                              <p:par>
+                                <p:cTn id="13" presetID="1" presetClass="entr" presetSubtype="0" fill="hold" grpId="0" nodeType="clickEffect">
+                                  <p:stCondLst>
+                                    <p:cond delay="0"/>
+                                  </p:stCondLst>
+                                  <p:childTnLst>
+                                    <p:set>
+                                      <p:cBhvr>
+                                        <p:cTn id="14" dur="1" fill="hold">
+                                          <p:stCondLst>
+                                            <p:cond delay="0"/>
+                                          </p:stCondLst>
+                                        </p:cTn>
+                                        <p:tgtEl>
+                                          <p:spTgt spid="3">
+                                            <p:txEl>
+                                              <p:pRg st="2" end="2"/>
+                                            </p:txEl>
+                                          </p:spTgt>
+                                        </p:tgtEl>
+                                        <p:attrNameLst>
+                                          <p:attrName>style.visibility</p:attrName>
+                                        </p:attrNameLst>
+                                      </p:cBhvr>
+                                      <p:to>
+                                        <p:strVal val="visible"/>
+                                      </p:to>
+                                    </p:set>
+                                  </p:childTnLst>
+                                </p:cTn>
+                              </p:par>
+                            </p:childTnLst>
+                          </p:cTn>
+                        </p:par>
+                      </p:childTnLst>
+                    </p:cTn>
+                  </p:par>
+                  <p:par>
+                    <p:cTn id="15" fill="hold">
+                      <p:stCondLst>
+                        <p:cond delay="indefinite"/>
+                      </p:stCondLst>
+                      <p:childTnLst>
+                        <p:par>
+                          <p:cTn id="16" fill="hold">
+                            <p:stCondLst>
+                              <p:cond delay="0"/>
+                            </p:stCondLst>
+                            <p:childTnLst>
+                              <p:par>
+                                <p:cTn id="17" presetID="1" presetClass="entr" presetSubtype="0" fill="hold" grpId="0" nodeType="clickEffect">
+                                  <p:stCondLst>
+                                    <p:cond delay="0"/>
+                                  </p:stCondLst>
+                                  <p:childTnLst>
+                                    <p:set>
+                                      <p:cBhvr>
+                                        <p:cTn id="18" dur="1" fill="hold">
+                                          <p:stCondLst>
+                                            <p:cond delay="0"/>
+                                          </p:stCondLst>
+                                        </p:cTn>
+                                        <p:tgtEl>
+                                          <p:spTgt spid="3">
+                                            <p:txEl>
+                                              <p:pRg st="3" end="3"/>
+                                            </p:txEl>
+                                          </p:spTgt>
+                                        </p:tgtEl>
+                                        <p:attrNameLst>
+                                          <p:attrName>style.visibility</p:attrName>
+                                        </p:attrNameLst>
+                                      </p:cBhvr>
+                                      <p:to>
+                                        <p:strVal val="visible"/>
+                                      </p:to>
+                                    </p:set>
+                                  </p:childTnLst>
+                                </p:cTn>
+                              </p:par>
+                            </p:childTnLst>
+                          </p:cTn>
+                        </p:par>
+                      </p:childTnLst>
+                    </p:cTn>
+                  </p:par>
+                  <p:par>
+                    <p:cTn id="19" fill="hold">
+                      <p:stCondLst>
+                        <p:cond delay="indefinite"/>
+                      </p:stCondLst>
+                      <p:childTnLst>
+                        <p:par>
+                          <p:cTn id="20" fill="hold">
+                            <p:stCondLst>
+                              <p:cond delay="0"/>
+                            </p:stCondLst>
+                            <p:childTnLst>
+                              <p:par>
+                                <p:cTn id="21" presetID="1" presetClass="entr" presetSubtype="0" fill="hold" grpId="0" nodeType="clickEffect">
+                                  <p:stCondLst>
+                                    <p:cond delay="0"/>
+                                  </p:stCondLst>
+                                  <p:childTnLst>
+                                    <p:set>
+                                      <p:cBhvr>
+                                        <p:cTn id="22" dur="1" fill="hold">
+                                          <p:stCondLst>
+                                            <p:cond delay="0"/>
+                                          </p:stCondLst>
+                                        </p:cTn>
+                                        <p:tgtEl>
+                                          <p:spTgt spid="3">
+                                            <p:txEl>
+                                              <p:pRg st="4" end="4"/>
+                                            </p:txEl>
+                                          </p:spTgt>
+                                        </p:tgtEl>
+                                        <p:attrNameLst>
+                                          <p:attrName>style.visibility</p:attrName>
+                                        </p:attrNameLst>
+                                      </p:cBhvr>
+                                      <p:to>
+                                        <p:strVal val="visible"/>
+                                      </p:to>
+                                    </p:set>
+                                  </p:childTnLst>
+                                </p:cTn>
+                              </p:par>
+                            </p:childTnLst>
+                          </p:cTn>
+                        </p:par>
+                      </p:childTnLst>
+                    </p:cTn>
+                  </p:par>
+                  <p:par>
+                    <p:cTn id="23" fill="hold">
+                      <p:stCondLst>
+                        <p:cond delay="indefinite"/>
+                      </p:stCondLst>
+                      <p:childTnLst>
+                        <p:par>
+                          <p:cTn id="24" fill="hold">
+                            <p:stCondLst>
+                              <p:cond delay="0"/>
+                            </p:stCondLst>
+                            <p:childTnLst>
+                              <p:par>
+                                <p:cTn id="25" presetID="1" presetClass="entr" presetSubtype="0" fill="hold" grpId="0" nodeType="clickEffect">
+                                  <p:stCondLst>
+                                    <p:cond delay="0"/>
+                                  </p:stCondLst>
+                                  <p:childTnLst>
+                                    <p:set>
+                                      <p:cBhvr>
+                                        <p:cTn id="26" dur="1" fill="hold">
+                                          <p:stCondLst>
+                                            <p:cond delay="0"/>
+                                          </p:stCondLst>
+                                        </p:cTn>
+                                        <p:tgtEl>
+                                          <p:spTgt spid="3">
+                                            <p:txEl>
+                                              <p:pRg st="5" end="5"/>
+                                            </p:txEl>
+                                          </p:spTgt>
+                                        </p:tgtEl>
+                                        <p:attrNameLst>
+                                          <p:attrName>style.visibility</p:attrName>
+                                        </p:attrNameLst>
+                                      </p:cBhvr>
+                                      <p:to>
+                                        <p:strVal val="visible"/>
+                                      </p:to>
+                                    </p:set>
+                                  </p:childTnLst>
+                                </p:cTn>
+                              </p:par>
+                            </p:childTnLst>
+                          </p:cTn>
+                        </p:par>
+                      </p:childTnLst>
+                    </p:cTn>
+                  </p:par>
+                  <p:par>
+                    <p:cTn id="27" fill="hold">
+                      <p:stCondLst>
+                        <p:cond delay="indefinite"/>
+                      </p:stCondLst>
+                      <p:childTnLst>
+                        <p:par>
+                          <p:cTn id="28" fill="hold">
+                            <p:stCondLst>
+                              <p:cond delay="0"/>
+                            </p:stCondLst>
+                            <p:childTnLst>
+                              <p:par>
+                                <p:cTn id="29" presetID="1" presetClass="entr" presetSubtype="0" fill="hold" grpId="0" nodeType="clickEffect">
+                                  <p:stCondLst>
+                                    <p:cond delay="0"/>
+                                  </p:stCondLst>
+                                  <p:childTnLst>
+                                    <p:set>
+                                      <p:cBhvr>
+                                        <p:cTn id="30" dur="1" fill="hold">
+                                          <p:stCondLst>
+                                            <p:cond delay="0"/>
+                                          </p:stCondLst>
+                                        </p:cTn>
+                                        <p:tgtEl>
+                                          <p:spTgt spid="5"/>
+                                        </p:tgtEl>
+                                        <p:attrNameLst>
+                                          <p:attrName>style.visibility</p:attrName>
+                                        </p:attrNameLst>
+                                      </p:cBhvr>
+                                      <p:to>
+                                        <p:strVal val="visible"/>
+                                      </p:to>
+                                    </p:set>
+                                  </p:childTnLst>
+                                </p:cTn>
+                              </p:par>
+                            </p:childTnLst>
+                          </p:cTn>
+                        </p:par>
+                      </p:childTnLst>
+                    </p:cTn>
+                  </p:par>
+                </p:childTnLst>
+              </p:cTn>
+              <p:prevCondLst>
+                <p:cond evt="onPrev" delay="0">
+                  <p:tgtEl>
+                    <p:sldTgt/>
+                  </p:tgtEl>
+                </p:cond>
+              </p:prevCondLst>
+              <p:nextCondLst>
+                <p:cond evt="onNext" delay="0">
+                  <p:tgtEl>
+                    <p:sldTgt/>
+                  </p:tgtEl>
+                </p:cond>
+              </p:nextCondLst>
+            </p:seq>
+          </p:childTnLst>
+        </p:cTn>
+      </p:par>
+    </p:tnLst>
+    <p:bldLst>
+      <p:bldP spid="3" grpId="0" uiExpand="1" build="p"/>
+      <p:bldP spid="5" grpId="0" animBg="1"/>
+    </p:bldLst>
+  </p:timing>
+</p:sld>
+</file>
+
+<file path=ppt/slides/slide19.xml><?xml version="1.0" encoding="utf-8"?>
+<p:sld xmlns:a="http://schemas.openxmlformats.org/drawingml/2006/main" xmlns:r="http://schemas.openxmlformats.org/officeDocument/2006/relationships" xmlns:p="http://schemas.openxmlformats.org/presentationml/2006/main">
+  <p:cSld>
+    <p:spTree>
+      <p:nvGrpSpPr>
+        <p:cNvPr id="1" name=""/>
+        <p:cNvGrpSpPr/>
+        <p:nvPr/>
+      </p:nvGrpSpPr>
+      <p:grpSpPr>
+        <a:xfrm>
+          <a:off x="0" y="0"/>
+          <a:ext cx="0" cy="0"/>
+          <a:chOff x="0" y="0"/>
+          <a:chExt cx="0" cy="0"/>
+        </a:xfrm>
+      </p:grpSpPr>
+      <p:sp>
+        <p:nvSpPr>
+          <p:cNvPr id="2" name="Title 1"/>
+          <p:cNvSpPr>
+            <a:spLocks noGrp="1"/>
+          </p:cNvSpPr>
+          <p:nvPr>
+            <p:ph type="title"/>
+          </p:nvPr>
+        </p:nvSpPr>
+        <p:spPr/>
+        <p:txBody>
+          <a:bodyPr/>
+          <a:lstStyle/>
+          <a:p>
+            <a:r>
+              <a:rPr lang="en-US" dirty="0" smtClean="0"/>
+              <a:t>Exit</a:t>
+            </a:r>
+            <a:endParaRPr lang="en-US" dirty="0"/>
+          </a:p>
+        </p:txBody>
+      </p:sp>
+      <p:sp>
+        <p:nvSpPr>
+          <p:cNvPr id="3" name="Content Placeholder 2"/>
+          <p:cNvSpPr>
+            <a:spLocks noGrp="1"/>
+          </p:cNvSpPr>
+          <p:nvPr>
+            <p:ph idx="1"/>
+          </p:nvPr>
+        </p:nvSpPr>
+        <p:spPr>
+          <a:xfrm>
+            <a:off x="628650" y="1835457"/>
+            <a:ext cx="7886700" cy="4351338"/>
+          </a:xfrm>
+        </p:spPr>
+        <p:txBody>
+          <a:bodyPr/>
+          <a:lstStyle/>
+          <a:p>
+            <a:r>
+              <a:rPr lang="en-US" dirty="0" smtClean="0"/>
+              <a:t>Use </a:t>
+            </a:r>
+            <a:r>
+              <a:rPr lang="en-US" dirty="0" err="1" smtClean="0">
+                <a:latin typeface="Courier New" panose="02070309020205020404" pitchFamily="49" charset="0"/>
+                <a:cs typeface="Courier New" panose="02070309020205020404" pitchFamily="49" charset="0"/>
+              </a:rPr>
+              <a:t>std</a:t>
+            </a:r>
+            <a:r>
+              <a:rPr lang="en-US" dirty="0" smtClean="0">
+                <a:latin typeface="Courier New" panose="02070309020205020404" pitchFamily="49" charset="0"/>
+                <a:cs typeface="Courier New" panose="02070309020205020404" pitchFamily="49" charset="0"/>
+              </a:rPr>
+              <a:t>::exit(</a:t>
+            </a:r>
+            <a:r>
+              <a:rPr lang="en-US" dirty="0" smtClean="0"/>
+              <a:t>n</a:t>
+            </a:r>
+            <a:r>
+              <a:rPr lang="en-US" dirty="0" smtClean="0">
+                <a:latin typeface="Courier New" panose="02070309020205020404" pitchFamily="49" charset="0"/>
+                <a:cs typeface="Courier New" panose="02070309020205020404" pitchFamily="49" charset="0"/>
+              </a:rPr>
+              <a:t>)</a:t>
+            </a:r>
+            <a:r>
+              <a:rPr lang="en-US" dirty="0" smtClean="0"/>
+              <a:t> to convey exit status to shell</a:t>
+            </a:r>
+          </a:p>
+          <a:p>
+            <a:pPr lvl="1"/>
+            <a:r>
+              <a:rPr lang="en-US" dirty="0" smtClean="0"/>
+              <a:t>0: success</a:t>
+            </a:r>
+          </a:p>
+          <a:p>
+            <a:pPr lvl="1"/>
+            <a:r>
+              <a:rPr lang="en-US" dirty="0" smtClean="0"/>
+              <a:t>1-127: failure</a:t>
+            </a:r>
+          </a:p>
+          <a:p>
+            <a:r>
+              <a:rPr lang="en-US" dirty="0" smtClean="0"/>
+              <a:t>Non-zero exit status</a:t>
+            </a:r>
+          </a:p>
+          <a:p>
+            <a:pPr lvl="1"/>
+            <a:r>
+              <a:rPr lang="en-US" dirty="0" smtClean="0"/>
+              <a:t>pick value per error condition, allows shell to do error handling</a:t>
+            </a:r>
+          </a:p>
+          <a:p>
+            <a:pPr lvl="1"/>
+            <a:r>
+              <a:rPr lang="en-US" dirty="0" smtClean="0"/>
+              <a:t>e.g., 1 </a:t>
+            </a:r>
+            <a:r>
+              <a:rPr lang="en-US" dirty="0" smtClean="0">
+                <a:sym typeface="Symbol" panose="05050102010706020507" pitchFamily="18" charset="2"/>
+              </a:rPr>
+              <a:t></a:t>
+            </a:r>
+            <a:r>
+              <a:rPr lang="en-US" dirty="0" smtClean="0"/>
+              <a:t> missing argument, 2</a:t>
+            </a:r>
+            <a:r>
+              <a:rPr lang="en-US" dirty="0"/>
+              <a:t> </a:t>
+            </a:r>
+            <a:r>
+              <a:rPr lang="en-US" dirty="0">
+                <a:sym typeface="Symbol" panose="05050102010706020507" pitchFamily="18" charset="2"/>
+              </a:rPr>
+              <a:t></a:t>
+            </a:r>
+            <a:r>
+              <a:rPr lang="en-US" dirty="0"/>
+              <a:t> </a:t>
+            </a:r>
+            <a:r>
+              <a:rPr lang="en-US" dirty="0" smtClean="0"/>
+              <a:t>wrong argument  type,</a:t>
+            </a:r>
+            <a:br>
+              <a:rPr lang="en-US" dirty="0" smtClean="0"/>
+            </a:br>
+            <a:r>
+              <a:rPr lang="en-US" dirty="0" smtClean="0"/>
+              <a:t>         3</a:t>
+            </a:r>
+            <a:r>
+              <a:rPr lang="en-US" dirty="0"/>
+              <a:t> </a:t>
+            </a:r>
+            <a:r>
+              <a:rPr lang="en-US" dirty="0">
+                <a:sym typeface="Symbol" panose="05050102010706020507" pitchFamily="18" charset="2"/>
+              </a:rPr>
+              <a:t></a:t>
+            </a:r>
+            <a:r>
+              <a:rPr lang="en-US" dirty="0"/>
+              <a:t> </a:t>
+            </a:r>
+            <a:r>
+              <a:rPr lang="en-US" dirty="0" smtClean="0"/>
+              <a:t>wrong argument value</a:t>
+            </a:r>
+            <a:endParaRPr lang="en-US" dirty="0"/>
+          </a:p>
+        </p:txBody>
+      </p:sp>
+      <p:sp>
+        <p:nvSpPr>
+          <p:cNvPr id="4" name="Slide Number Placeholder 3"/>
+          <p:cNvSpPr>
+            <a:spLocks noGrp="1"/>
+          </p:cNvSpPr>
+          <p:nvPr>
+            <p:ph type="sldNum" sz="quarter" idx="12"/>
+          </p:nvPr>
+        </p:nvSpPr>
+        <p:spPr/>
+        <p:txBody>
+          <a:bodyPr/>
+          <a:lstStyle/>
+          <a:p>
+            <a:fld id="{2F8BA72C-5DC7-4014-AC42-C5F5AAAF9B79}" type="slidenum">
+              <a:rPr lang="en-US" smtClean="0"/>
+              <a:t>19</a:t>
+            </a:fld>
+            <a:endParaRPr lang="en-US"/>
+          </a:p>
+        </p:txBody>
+      </p:sp>
+      <p:sp>
+        <p:nvSpPr>
+          <p:cNvPr id="5" name="TextBox 4"/>
+          <p:cNvSpPr txBox="1"/>
+          <p:nvPr/>
+        </p:nvSpPr>
+        <p:spPr>
+          <a:xfrm>
+            <a:off x="1061883" y="5260257"/>
+            <a:ext cx="6784259" cy="1200329"/>
+          </a:xfrm>
+          <a:prstGeom prst="rect">
+            <a:avLst/>
+          </a:prstGeom>
+          <a:solidFill>
+            <a:schemeClr val="tx1"/>
+          </a:solidFill>
+        </p:spPr>
+        <p:txBody>
+          <a:bodyPr wrap="square" rtlCol="0">
+            <a:spAutoFit/>
+          </a:bodyPr>
+          <a:lstStyle/>
+          <a:p>
+            <a:r>
+              <a:rPr lang="en-US" b="1" dirty="0" smtClean="0">
+                <a:solidFill>
+                  <a:schemeClr val="bg1"/>
+                </a:solidFill>
+                <a:latin typeface="Courier New" panose="02070309020205020404" pitchFamily="49" charset="0"/>
+                <a:cs typeface="Courier New" panose="02070309020205020404" pitchFamily="49" charset="0"/>
+              </a:rPr>
+              <a:t>$  </a:t>
+            </a:r>
+            <a:r>
+              <a:rPr lang="en-US" b="1" dirty="0" smtClean="0">
+                <a:solidFill>
+                  <a:schemeClr val="bg1"/>
+                </a:solidFill>
+                <a:latin typeface="Courier New" panose="02070309020205020404" pitchFamily="49" charset="0"/>
+                <a:cs typeface="Courier New" panose="02070309020205020404" pitchFamily="49" charset="0"/>
+              </a:rPr>
+              <a:t>fac.exe  -1</a:t>
+            </a:r>
+          </a:p>
+          <a:p>
+            <a:r>
+              <a:rPr lang="en-US" b="1" dirty="0" smtClean="0">
+                <a:solidFill>
+                  <a:schemeClr val="bg1"/>
+                </a:solidFill>
+                <a:latin typeface="Courier New" panose="02070309020205020404" pitchFamily="49" charset="0"/>
+                <a:cs typeface="Courier New" panose="02070309020205020404" pitchFamily="49" charset="0"/>
+              </a:rPr>
+              <a:t># error: invalid argument value -1</a:t>
+            </a:r>
+          </a:p>
+          <a:p>
+            <a:r>
+              <a:rPr lang="en-US" b="1" dirty="0" smtClean="0">
+                <a:solidFill>
+                  <a:schemeClr val="bg1"/>
+                </a:solidFill>
+                <a:latin typeface="Courier New" panose="02070309020205020404" pitchFamily="49" charset="0"/>
+                <a:cs typeface="Courier New" panose="02070309020205020404" pitchFamily="49" charset="0"/>
+              </a:rPr>
+              <a:t>$  echo  $?</a:t>
+            </a:r>
+          </a:p>
+          <a:p>
+            <a:r>
+              <a:rPr lang="en-US" b="1" dirty="0">
+                <a:solidFill>
+                  <a:schemeClr val="bg1"/>
+                </a:solidFill>
+                <a:latin typeface="Courier New" panose="02070309020205020404" pitchFamily="49" charset="0"/>
+                <a:cs typeface="Courier New" panose="02070309020205020404" pitchFamily="49" charset="0"/>
+              </a:rPr>
+              <a:t>3</a:t>
+            </a:r>
+            <a:endParaRPr lang="en-US" b="1" dirty="0">
+              <a:solidFill>
+                <a:schemeClr val="bg1"/>
+              </a:solidFill>
+              <a:latin typeface="Courier New" panose="02070309020205020404" pitchFamily="49" charset="0"/>
+              <a:cs typeface="Courier New" panose="02070309020205020404" pitchFamily="49" charset="0"/>
+            </a:endParaRPr>
+          </a:p>
+        </p:txBody>
+      </p:sp>
+    </p:spTree>
+    <p:extLst>
+      <p:ext uri="{BB962C8B-B14F-4D97-AF65-F5344CB8AC3E}">
+        <p14:creationId xmlns:p14="http://schemas.microsoft.com/office/powerpoint/2010/main" val="155534372"/>
+      </p:ext>
+    </p:extLst>
+  </p:cSld>
+  <p:clrMapOvr>
+    <a:masterClrMapping/>
+  </p:clrMapOvr>
+  <p:timing>
+    <p:tnLst>
+      <p:par>
+        <p:cTn id="1" dur="indefinite" restart="never" nodeType="tmRoot">
+          <p:childTnLst>
+            <p:seq concurrent="1" nextAc="seek">
+              <p:cTn id="2" dur="indefinite" nodeType="mainSeq">
+                <p:childTnLst>
+                  <p:par>
+                    <p:cTn id="3" fill="hold">
+                      <p:stCondLst>
+                        <p:cond delay="indefinite"/>
+                        <p:cond evt="onBegin" delay="0">
+                          <p:tn val="2"/>
+                        </p:cond>
+                      </p:stCondLst>
+                      <p:childTnLst>
+                        <p:par>
+                          <p:cTn id="4" fill="hold">
+                            <p:stCondLst>
+                              <p:cond delay="0"/>
+                            </p:stCondLst>
+                            <p:childTnLst>
+                              <p:par>
+                                <p:cTn id="5" presetID="1" presetClass="entr" presetSubtype="0" fill="hold" grpId="0" nodeType="withEffect">
+                                  <p:stCondLst>
+                                    <p:cond delay="0"/>
+                                  </p:stCondLst>
+                                  <p:childTnLst>
+                                    <p:set>
+                                      <p:cBhvr>
+                                        <p:cTn id="6" dur="1" fill="hold">
+                                          <p:stCondLst>
+                                            <p:cond delay="0"/>
+                                          </p:stCondLst>
+                                        </p:cTn>
+                                        <p:tgtEl>
+                                          <p:spTgt spid="3">
+                                            <p:txEl>
+                                              <p:pRg st="0" end="0"/>
+                                            </p:txEl>
+                                          </p:spTgt>
+                                        </p:tgtEl>
+                                        <p:attrNameLst>
+                                          <p:attrName>style.visibility</p:attrName>
+                                        </p:attrNameLst>
+                                      </p:cBhvr>
+                                      <p:to>
+                                        <p:strVal val="visible"/>
+                                      </p:to>
+                                    </p:set>
+                                  </p:childTnLst>
+                                </p:cTn>
+                              </p:par>
+                              <p:par>
+                                <p:cTn id="7" presetID="1" presetClass="entr" presetSubtype="0" fill="hold" grpId="0" nodeType="withEffect">
+                                  <p:stCondLst>
+                                    <p:cond delay="0"/>
+                                  </p:stCondLst>
+                                  <p:childTnLst>
+                                    <p:set>
+                                      <p:cBhvr>
+                                        <p:cTn id="8" dur="1" fill="hold">
+                                          <p:stCondLst>
+                                            <p:cond delay="0"/>
+                                          </p:stCondLst>
+                                        </p:cTn>
+                                        <p:tgtEl>
+                                          <p:spTgt spid="3">
+                                            <p:txEl>
+                                              <p:pRg st="1" end="1"/>
+                                            </p:txEl>
+                                          </p:spTgt>
+                                        </p:tgtEl>
+                                        <p:attrNameLst>
+                                          <p:attrName>style.visibility</p:attrName>
+                                        </p:attrNameLst>
+                                      </p:cBhvr>
+                                      <p:to>
+                                        <p:strVal val="visible"/>
+                                      </p:to>
+                                    </p:set>
+                                  </p:childTnLst>
+                                </p:cTn>
+                              </p:par>
+                              <p:par>
+                                <p:cTn id="9" presetID="1" presetClass="entr" presetSubtype="0" fill="hold" grpId="0" nodeType="withEffect">
+                                  <p:stCondLst>
+                                    <p:cond delay="0"/>
+                                  </p:stCondLst>
+                                  <p:childTnLst>
+                                    <p:set>
+                                      <p:cBhvr>
+                                        <p:cTn id="10" dur="1" fill="hold">
+                                          <p:stCondLst>
+                                            <p:cond delay="0"/>
+                                          </p:stCondLst>
+                                        </p:cTn>
+                                        <p:tgtEl>
+                                          <p:spTgt spid="3">
+                                            <p:txEl>
+                                              <p:pRg st="2" end="2"/>
+                                            </p:txEl>
+                                          </p:spTgt>
+                                        </p:tgtEl>
+                                        <p:attrNameLst>
+                                          <p:attrName>style.visibility</p:attrName>
+                                        </p:attrNameLst>
+                                      </p:cBhvr>
+                                      <p:to>
+                                        <p:strVal val="visible"/>
+                                      </p:to>
+                                    </p:set>
+                                  </p:childTnLst>
+                                </p:cTn>
+                              </p:par>
+                            </p:childTnLst>
+                          </p:cTn>
+                        </p:par>
+                      </p:childTnLst>
+                    </p:cTn>
+                  </p:par>
+                  <p:par>
+                    <p:cTn id="11" fill="hold">
+                      <p:stCondLst>
+                        <p:cond delay="indefinite"/>
+                      </p:stCondLst>
+                      <p:childTnLst>
+                        <p:par>
+                          <p:cTn id="12" fill="hold">
+                            <p:stCondLst>
+                              <p:cond delay="0"/>
+                            </p:stCondLst>
+                            <p:childTnLst>
+                              <p:par>
+                                <p:cTn id="13" presetID="1" presetClass="entr" presetSubtype="0" fill="hold" grpId="0" nodeType="clickEffect">
+                                  <p:stCondLst>
+                                    <p:cond delay="0"/>
+                                  </p:stCondLst>
+                                  <p:childTnLst>
+                                    <p:set>
+                                      <p:cBhvr>
+                                        <p:cTn id="14" dur="1" fill="hold">
+                                          <p:stCondLst>
+                                            <p:cond delay="0"/>
+                                          </p:stCondLst>
+                                        </p:cTn>
+                                        <p:tgtEl>
+                                          <p:spTgt spid="3">
+                                            <p:txEl>
+                                              <p:pRg st="3" end="3"/>
+                                            </p:txEl>
+                                          </p:spTgt>
+                                        </p:tgtEl>
+                                        <p:attrNameLst>
+                                          <p:attrName>style.visibility</p:attrName>
+                                        </p:attrNameLst>
+                                      </p:cBhvr>
+                                      <p:to>
+                                        <p:strVal val="visible"/>
+                                      </p:to>
+                                    </p:set>
+                                  </p:childTnLst>
+                                </p:cTn>
+                              </p:par>
+                              <p:par>
+                                <p:cTn id="15" presetID="1" presetClass="entr" presetSubtype="0" fill="hold" grpId="0" nodeType="withEffect">
+                                  <p:stCondLst>
+                                    <p:cond delay="0"/>
+                                  </p:stCondLst>
+                                  <p:childTnLst>
+                                    <p:set>
+                                      <p:cBhvr>
+                                        <p:cTn id="16" dur="1" fill="hold">
+                                          <p:stCondLst>
+                                            <p:cond delay="0"/>
+                                          </p:stCondLst>
+                                        </p:cTn>
+                                        <p:tgtEl>
+                                          <p:spTgt spid="3">
+                                            <p:txEl>
+                                              <p:pRg st="4" end="4"/>
+                                            </p:txEl>
+                                          </p:spTgt>
+                                        </p:tgtEl>
+                                        <p:attrNameLst>
+                                          <p:attrName>style.visibility</p:attrName>
+                                        </p:attrNameLst>
+                                      </p:cBhvr>
+                                      <p:to>
+                                        <p:strVal val="visible"/>
+                                      </p:to>
+                                    </p:set>
+                                  </p:childTnLst>
+                                </p:cTn>
+                              </p:par>
+                              <p:par>
+                                <p:cTn id="17" presetID="1" presetClass="entr" presetSubtype="0" fill="hold" grpId="0" nodeType="withEffect">
+                                  <p:stCondLst>
+                                    <p:cond delay="0"/>
+                                  </p:stCondLst>
+                                  <p:childTnLst>
+                                    <p:set>
+                                      <p:cBhvr>
+                                        <p:cTn id="18" dur="1" fill="hold">
+                                          <p:stCondLst>
+                                            <p:cond delay="0"/>
+                                          </p:stCondLst>
+                                        </p:cTn>
+                                        <p:tgtEl>
+                                          <p:spTgt spid="3">
+                                            <p:txEl>
+                                              <p:pRg st="5" end="5"/>
+                                            </p:txEl>
+                                          </p:spTgt>
+                                        </p:tgtEl>
+                                        <p:attrNameLst>
+                                          <p:attrName>style.visibility</p:attrName>
+                                        </p:attrNameLst>
+                                      </p:cBhvr>
+                                      <p:to>
+                                        <p:strVal val="visible"/>
+                                      </p:to>
+                                    </p:set>
+                                  </p:childTnLst>
+                                </p:cTn>
+                              </p:par>
+                              <p:par>
+                                <p:cTn id="19" presetID="1" presetClass="entr" presetSubtype="0" fill="hold" grpId="0" nodeType="withEffect">
+                                  <p:stCondLst>
+                                    <p:cond delay="0"/>
+                                  </p:stCondLst>
+                                  <p:childTnLst>
+                                    <p:set>
+                                      <p:cBhvr>
+                                        <p:cTn id="20" dur="1" fill="hold">
+                                          <p:stCondLst>
+                                            <p:cond delay="0"/>
+                                          </p:stCondLst>
+                                        </p:cTn>
+                                        <p:tgtEl>
+                                          <p:spTgt spid="5"/>
+                                        </p:tgtEl>
+                                        <p:attrNameLst>
+                                          <p:attrName>style.visibility</p:attrName>
+                                        </p:attrNameLst>
+                                      </p:cBhvr>
+                                      <p:to>
+                                        <p:strVal val="visible"/>
+                                      </p:to>
+                                    </p:set>
+                                  </p:childTnLst>
+                                </p:cTn>
+                              </p:par>
+                            </p:childTnLst>
+                          </p:cTn>
+                        </p:par>
+                      </p:childTnLst>
+                    </p:cTn>
+                  </p:par>
+                </p:childTnLst>
+              </p:cTn>
+              <p:prevCondLst>
+                <p:cond evt="onPrev" delay="0">
+                  <p:tgtEl>
+                    <p:sldTgt/>
+                  </p:tgtEl>
+                </p:cond>
+              </p:prevCondLst>
+              <p:nextCondLst>
+                <p:cond evt="onNext" delay="0">
+                  <p:tgtEl>
+                    <p:sldTgt/>
+                  </p:tgtEl>
+                </p:cond>
+              </p:nextCondLst>
+            </p:seq>
+          </p:childTnLst>
+        </p:cTn>
+      </p:par>
+    </p:tnLst>
+    <p:bldLst>
+      <p:bldP spid="3" grpId="0" uiExpand="1" build="p"/>
+      <p:bldP spid="5" grpId="0" animBg="1"/>
+    </p:bldLst>
   </p:timing>
 </p:sld>
 </file>

</xml_diff>